<commit_message>
tweaking slides for video
</commit_message>
<xml_diff>
--- a/Courses/ML_Concepts/Module_01_Introduction_to_Classification/Module_01_Introduction_to_Classification_01_ClassificationBackground.pptx
+++ b/Courses/ML_Concepts/Module_01_Introduction_to_Classification/Module_01_Introduction_to_Classification_01_ClassificationBackground.pptx
@@ -205,7 +205,7 @@
           <a:p>
             <a:fld id="{8BF7BA16-693B-49DC-B4FA-AF7A11A8ED46}" type="datetimeFigureOut">
               <a:rPr lang="en-US" smtClean="0"/>
-              <a:t>11/15/2022</a:t>
+              <a:t>12/13/2022</a:t>
             </a:fld>
             <a:endParaRPr lang="en-US"/>
           </a:p>
@@ -871,7 +871,7 @@
           <a:p>
             <a:fld id="{D788A639-B81C-4455-ABEE-AAB245CF3941}" type="datetimeFigureOut">
               <a:rPr lang="en-US" smtClean="0"/>
-              <a:t>11/15/2022</a:t>
+              <a:t>12/13/2022</a:t>
             </a:fld>
             <a:endParaRPr lang="en-US"/>
           </a:p>
@@ -1069,7 +1069,7 @@
           <a:p>
             <a:fld id="{D788A639-B81C-4455-ABEE-AAB245CF3941}" type="datetimeFigureOut">
               <a:rPr lang="en-US" smtClean="0"/>
-              <a:t>11/15/2022</a:t>
+              <a:t>12/13/2022</a:t>
             </a:fld>
             <a:endParaRPr lang="en-US"/>
           </a:p>
@@ -1277,7 +1277,7 @@
           <a:p>
             <a:fld id="{D788A639-B81C-4455-ABEE-AAB245CF3941}" type="datetimeFigureOut">
               <a:rPr lang="en-US" smtClean="0"/>
-              <a:t>11/15/2022</a:t>
+              <a:t>12/13/2022</a:t>
             </a:fld>
             <a:endParaRPr lang="en-US"/>
           </a:p>
@@ -1475,7 +1475,7 @@
           <a:p>
             <a:fld id="{D788A639-B81C-4455-ABEE-AAB245CF3941}" type="datetimeFigureOut">
               <a:rPr lang="en-US" smtClean="0"/>
-              <a:t>11/15/2022</a:t>
+              <a:t>12/13/2022</a:t>
             </a:fld>
             <a:endParaRPr lang="en-US"/>
           </a:p>
@@ -1750,7 +1750,7 @@
           <a:p>
             <a:fld id="{D788A639-B81C-4455-ABEE-AAB245CF3941}" type="datetimeFigureOut">
               <a:rPr lang="en-US" smtClean="0"/>
-              <a:t>11/15/2022</a:t>
+              <a:t>12/13/2022</a:t>
             </a:fld>
             <a:endParaRPr lang="en-US"/>
           </a:p>
@@ -2015,7 +2015,7 @@
           <a:p>
             <a:fld id="{D788A639-B81C-4455-ABEE-AAB245CF3941}" type="datetimeFigureOut">
               <a:rPr lang="en-US" smtClean="0"/>
-              <a:t>11/15/2022</a:t>
+              <a:t>12/13/2022</a:t>
             </a:fld>
             <a:endParaRPr lang="en-US"/>
           </a:p>
@@ -2427,7 +2427,7 @@
           <a:p>
             <a:fld id="{D788A639-B81C-4455-ABEE-AAB245CF3941}" type="datetimeFigureOut">
               <a:rPr lang="en-US" smtClean="0"/>
-              <a:t>11/15/2022</a:t>
+              <a:t>12/13/2022</a:t>
             </a:fld>
             <a:endParaRPr lang="en-US"/>
           </a:p>
@@ -2568,7 +2568,7 @@
           <a:p>
             <a:fld id="{D788A639-B81C-4455-ABEE-AAB245CF3941}" type="datetimeFigureOut">
               <a:rPr lang="en-US" smtClean="0"/>
-              <a:t>11/15/2022</a:t>
+              <a:t>12/13/2022</a:t>
             </a:fld>
             <a:endParaRPr lang="en-US"/>
           </a:p>
@@ -2681,7 +2681,7 @@
           <a:p>
             <a:fld id="{D788A639-B81C-4455-ABEE-AAB245CF3941}" type="datetimeFigureOut">
               <a:rPr lang="en-US" smtClean="0"/>
-              <a:t>11/15/2022</a:t>
+              <a:t>12/13/2022</a:t>
             </a:fld>
             <a:endParaRPr lang="en-US"/>
           </a:p>
@@ -2992,7 +2992,7 @@
           <a:p>
             <a:fld id="{D788A639-B81C-4455-ABEE-AAB245CF3941}" type="datetimeFigureOut">
               <a:rPr lang="en-US" smtClean="0"/>
-              <a:t>11/15/2022</a:t>
+              <a:t>12/13/2022</a:t>
             </a:fld>
             <a:endParaRPr lang="en-US"/>
           </a:p>
@@ -3280,7 +3280,7 @@
           <a:p>
             <a:fld id="{D788A639-B81C-4455-ABEE-AAB245CF3941}" type="datetimeFigureOut">
               <a:rPr lang="en-US" smtClean="0"/>
-              <a:t>11/15/2022</a:t>
+              <a:t>12/13/2022</a:t>
             </a:fld>
             <a:endParaRPr lang="en-US"/>
           </a:p>
@@ -3521,7 +3521,7 @@
           <a:p>
             <a:fld id="{D788A639-B81C-4455-ABEE-AAB245CF3941}" type="datetimeFigureOut">
               <a:rPr lang="en-US" smtClean="0"/>
-              <a:t>11/15/2022</a:t>
+              <a:t>12/13/2022</a:t>
             </a:fld>
             <a:endParaRPr lang="en-US"/>
           </a:p>

</xml_diff>